<commit_message>
add content about merge in ppt
</commit_message>
<xml_diff>
--- a/ppt/githubdesktop.pptx
+++ b/ppt/githubdesktop.pptx
@@ -35,8 +35,8 @@
     <p:sldId id="285" r:id="rId29"/>
     <p:sldId id="286" r:id="rId30"/>
     <p:sldId id="287" r:id="rId31"/>
-    <p:sldId id="288" r:id="rId32"/>
-    <p:sldId id="289" r:id="rId33"/>
+    <p:sldId id="293" r:id="rId32"/>
+    <p:sldId id="288" r:id="rId33"/>
     <p:sldId id="291" r:id="rId34"/>
   </p:sldIdLst>
   <p:sldSz cx="9144000" cy="6858000" type="screen4x3"/>
@@ -321,7 +321,7 @@
             <a:fld id="{530820CF-B880-4189-942D-D702A7CBA730}" type="datetimeFigureOut">
               <a:rPr lang="zh-CN" altLang="en-US" smtClean="0"/>
               <a:pPr/>
-              <a:t>2018/11/9</a:t>
+              <a:t>2018/11/13</a:t>
             </a:fld>
             <a:endParaRPr lang="zh-CN" altLang="en-US"/>
           </a:p>
@@ -488,7 +488,7 @@
             <a:fld id="{530820CF-B880-4189-942D-D702A7CBA730}" type="datetimeFigureOut">
               <a:rPr lang="zh-CN" altLang="en-US" smtClean="0"/>
               <a:pPr/>
-              <a:t>2018/11/9</a:t>
+              <a:t>2018/11/13</a:t>
             </a:fld>
             <a:endParaRPr lang="zh-CN" altLang="en-US"/>
           </a:p>
@@ -665,7 +665,7 @@
             <a:fld id="{530820CF-B880-4189-942D-D702A7CBA730}" type="datetimeFigureOut">
               <a:rPr lang="zh-CN" altLang="en-US" smtClean="0"/>
               <a:pPr/>
-              <a:t>2018/11/9</a:t>
+              <a:t>2018/11/13</a:t>
             </a:fld>
             <a:endParaRPr lang="zh-CN" altLang="en-US"/>
           </a:p>
@@ -832,7 +832,7 @@
             <a:fld id="{530820CF-B880-4189-942D-D702A7CBA730}" type="datetimeFigureOut">
               <a:rPr lang="zh-CN" altLang="en-US" smtClean="0"/>
               <a:pPr/>
-              <a:t>2018/11/9</a:t>
+              <a:t>2018/11/13</a:t>
             </a:fld>
             <a:endParaRPr lang="zh-CN" altLang="en-US"/>
           </a:p>
@@ -1075,7 +1075,7 @@
             <a:fld id="{530820CF-B880-4189-942D-D702A7CBA730}" type="datetimeFigureOut">
               <a:rPr lang="zh-CN" altLang="en-US" smtClean="0"/>
               <a:pPr/>
-              <a:t>2018/11/9</a:t>
+              <a:t>2018/11/13</a:t>
             </a:fld>
             <a:endParaRPr lang="zh-CN" altLang="en-US"/>
           </a:p>
@@ -1360,7 +1360,7 @@
             <a:fld id="{530820CF-B880-4189-942D-D702A7CBA730}" type="datetimeFigureOut">
               <a:rPr lang="zh-CN" altLang="en-US" smtClean="0"/>
               <a:pPr/>
-              <a:t>2018/11/9</a:t>
+              <a:t>2018/11/13</a:t>
             </a:fld>
             <a:endParaRPr lang="zh-CN" altLang="en-US"/>
           </a:p>
@@ -1779,7 +1779,7 @@
             <a:fld id="{530820CF-B880-4189-942D-D702A7CBA730}" type="datetimeFigureOut">
               <a:rPr lang="zh-CN" altLang="en-US" smtClean="0"/>
               <a:pPr/>
-              <a:t>2018/11/9</a:t>
+              <a:t>2018/11/13</a:t>
             </a:fld>
             <a:endParaRPr lang="zh-CN" altLang="en-US"/>
           </a:p>
@@ -1894,7 +1894,7 @@
             <a:fld id="{530820CF-B880-4189-942D-D702A7CBA730}" type="datetimeFigureOut">
               <a:rPr lang="zh-CN" altLang="en-US" smtClean="0"/>
               <a:pPr/>
-              <a:t>2018/11/9</a:t>
+              <a:t>2018/11/13</a:t>
             </a:fld>
             <a:endParaRPr lang="zh-CN" altLang="en-US"/>
           </a:p>
@@ -1986,7 +1986,7 @@
             <a:fld id="{530820CF-B880-4189-942D-D702A7CBA730}" type="datetimeFigureOut">
               <a:rPr lang="zh-CN" altLang="en-US" smtClean="0"/>
               <a:pPr/>
-              <a:t>2018/11/9</a:t>
+              <a:t>2018/11/13</a:t>
             </a:fld>
             <a:endParaRPr lang="zh-CN" altLang="en-US"/>
           </a:p>
@@ -2260,7 +2260,7 @@
             <a:fld id="{530820CF-B880-4189-942D-D702A7CBA730}" type="datetimeFigureOut">
               <a:rPr lang="zh-CN" altLang="en-US" smtClean="0"/>
               <a:pPr/>
-              <a:t>2018/11/9</a:t>
+              <a:t>2018/11/13</a:t>
             </a:fld>
             <a:endParaRPr lang="zh-CN" altLang="en-US"/>
           </a:p>
@@ -2510,7 +2510,7 @@
             <a:fld id="{530820CF-B880-4189-942D-D702A7CBA730}" type="datetimeFigureOut">
               <a:rPr lang="zh-CN" altLang="en-US" smtClean="0"/>
               <a:pPr/>
-              <a:t>2018/11/9</a:t>
+              <a:t>2018/11/13</a:t>
             </a:fld>
             <a:endParaRPr lang="zh-CN" altLang="en-US"/>
           </a:p>
@@ -2720,7 +2720,7 @@
             <a:fld id="{530820CF-B880-4189-942D-D702A7CBA730}" type="datetimeFigureOut">
               <a:rPr lang="zh-CN" altLang="en-US" smtClean="0"/>
               <a:pPr/>
-              <a:t>2018/11/9</a:t>
+              <a:t>2018/11/13</a:t>
             </a:fld>
             <a:endParaRPr lang="zh-CN" altLang="en-US"/>
           </a:p>
@@ -4720,7 +4720,7 @@
         </p:spPr>
         <p:txBody>
           <a:bodyPr>
-            <a:normAutofit lnSpcReduction="10000"/>
+            <a:normAutofit fontScale="92500" lnSpcReduction="10000"/>
           </a:bodyPr>
           <a:lstStyle/>
           <a:p>
@@ -4782,11 +4782,35 @@
             </a:r>
             <a:r>
               <a:rPr lang="en-US" altLang="zh-CN" sz="1700" dirty="0" smtClean="0"/>
-              <a:t>Current branch-New branch</a:t>
+              <a:t>Current branch-New </a:t>
+            </a:r>
+            <a:r>
+              <a:rPr lang="en-US" altLang="zh-CN" sz="1700" dirty="0" smtClean="0"/>
+              <a:t>branch</a:t>
             </a:r>
             <a:r>
               <a:rPr lang="zh-CN" altLang="en-US" sz="1700" dirty="0" smtClean="0"/>
-              <a:t>，输入分支名，点击</a:t>
+              <a:t>（或</a:t>
+            </a:r>
+            <a:r>
+              <a:rPr lang="zh-CN" altLang="en-US" sz="1800" dirty="0" smtClean="0"/>
+              <a:t>点击</a:t>
+            </a:r>
+            <a:r>
+              <a:rPr lang="zh-CN" altLang="en-US" sz="1800" dirty="0" smtClean="0"/>
+              <a:t>菜单栏的</a:t>
+            </a:r>
+            <a:r>
+              <a:rPr lang="en-US" altLang="zh-CN" sz="1800" dirty="0" smtClean="0"/>
+              <a:t>Branch-New branch </a:t>
+            </a:r>
+            <a:r>
+              <a:rPr lang="zh-CN" altLang="en-US" sz="1700" dirty="0" smtClean="0"/>
+              <a:t>），</a:t>
+            </a:r>
+            <a:r>
+              <a:rPr lang="zh-CN" altLang="en-US" sz="1700" dirty="0" smtClean="0"/>
+              <a:t>输入分支名，点击</a:t>
             </a:r>
             <a:r>
               <a:rPr lang="en-US" altLang="zh-CN" sz="1700" dirty="0" smtClean="0"/>
@@ -5193,7 +5217,15 @@
             </a:pPr>
             <a:r>
               <a:rPr lang="zh-CN" altLang="en-US" sz="1600" dirty="0" smtClean="0"/>
-              <a:t>注：上传分支中的单个文件大小不能超过</a:t>
+              <a:t>注：上传分支中的单个文件</a:t>
+            </a:r>
+            <a:r>
+              <a:rPr lang="zh-CN" altLang="en-US" sz="1600" dirty="0" smtClean="0"/>
+              <a:t>大小一般不能</a:t>
+            </a:r>
+            <a:r>
+              <a:rPr lang="zh-CN" altLang="en-US" sz="1600" dirty="0" smtClean="0"/>
+              <a:t>超过</a:t>
             </a:r>
             <a:r>
               <a:rPr lang="en-US" altLang="zh-CN" sz="1600" dirty="0" smtClean="0"/>
@@ -10340,6 +10372,739 @@
           <a:p>
             <a:r>
               <a:rPr lang="zh-CN" altLang="en-US" dirty="0" smtClean="0"/>
+              <a:t>合并（</a:t>
+            </a:r>
+            <a:r>
+              <a:rPr lang="en-US" altLang="zh-CN" dirty="0" smtClean="0"/>
+              <a:t>Merge</a:t>
+            </a:r>
+            <a:r>
+              <a:rPr lang="zh-CN" altLang="en-US" dirty="0" smtClean="0"/>
+              <a:t>）</a:t>
+            </a:r>
+            <a:endParaRPr lang="zh-CN" altLang="en-US" dirty="0"/>
+          </a:p>
+        </p:txBody>
+      </p:sp>
+      <p:sp>
+        <p:nvSpPr>
+          <p:cNvPr id="3" name="内容占位符 2"/>
+          <p:cNvSpPr>
+            <a:spLocks noGrp="1"/>
+          </p:cNvSpPr>
+          <p:nvPr>
+            <p:ph idx="1"/>
+          </p:nvPr>
+        </p:nvSpPr>
+        <p:spPr>
+          <a:xfrm>
+            <a:off x="457200" y="1285860"/>
+            <a:ext cx="8229600" cy="5286412"/>
+          </a:xfrm>
+        </p:spPr>
+        <p:txBody>
+          <a:bodyPr>
+            <a:normAutofit fontScale="47500" lnSpcReduction="20000"/>
+          </a:bodyPr>
+          <a:lstStyle/>
+          <a:p>
+            <a:r>
+              <a:rPr lang="en-US" sz="4000" dirty="0" smtClean="0"/>
+              <a:t>merge </a:t>
+            </a:r>
+            <a:r>
+              <a:rPr lang="zh-CN" altLang="en-US" sz="4000" dirty="0" smtClean="0"/>
+              <a:t>的三种形式：</a:t>
+            </a:r>
+            <a:endParaRPr lang="en-US" altLang="zh-CN" sz="4000" dirty="0" smtClean="0"/>
+          </a:p>
+          <a:p>
+            <a:pPr>
+              <a:buFont typeface="Wingdings" pitchFamily="2" charset="2"/>
+              <a:buChar char="ü"/>
+            </a:pPr>
+            <a:r>
+              <a:rPr lang="zh-CN" altLang="en-US" dirty="0" smtClean="0"/>
+              <a:t>普通的 </a:t>
+            </a:r>
+            <a:r>
+              <a:rPr lang="en-US" dirty="0" smtClean="0"/>
+              <a:t>merge</a:t>
+            </a:r>
+            <a:r>
+              <a:rPr lang="zh-CN" altLang="en-US" dirty="0" smtClean="0"/>
+              <a:t>：不能保持 </a:t>
+            </a:r>
+            <a:r>
+              <a:rPr lang="en-US" dirty="0" smtClean="0"/>
+              <a:t>master </a:t>
+            </a:r>
+            <a:r>
+              <a:rPr lang="zh-CN" altLang="en-US" dirty="0" smtClean="0"/>
+              <a:t>分支干净，但是保存了所有</a:t>
+            </a:r>
+            <a:r>
+              <a:rPr lang="en-US" dirty="0" smtClean="0"/>
+              <a:t>commit </a:t>
+            </a:r>
+            <a:r>
+              <a:rPr lang="zh-CN" altLang="en-US" dirty="0" smtClean="0"/>
+              <a:t>历史（在跟踪需要展示过程的分支时使用，并且加上</a:t>
+            </a:r>
+            <a:r>
+              <a:rPr lang="en-US" altLang="zh-CN" dirty="0" smtClean="0"/>
+              <a:t>--no-ff</a:t>
+            </a:r>
+            <a:r>
+              <a:rPr lang="zh-CN" altLang="en-US" dirty="0" smtClean="0"/>
+              <a:t>参数，让分支历史永远存续在主分支上）</a:t>
+            </a:r>
+            <a:endParaRPr lang="en-US" altLang="zh-CN" dirty="0" smtClean="0"/>
+          </a:p>
+          <a:p>
+            <a:r>
+              <a:rPr lang="zh-CN" altLang="en-US" dirty="0" smtClean="0"/>
+              <a:t>使用：</a:t>
+            </a:r>
+            <a:endParaRPr lang="en-US" altLang="zh-CN" dirty="0" smtClean="0"/>
+          </a:p>
+          <a:p>
+            <a:pPr>
+              <a:buFont typeface="+mj-lt"/>
+              <a:buAutoNum type="arabicPeriod"/>
+            </a:pPr>
+            <a:r>
+              <a:rPr lang="zh-CN" altLang="en-US" dirty="0" smtClean="0"/>
+              <a:t>切换到目标分支（如：</a:t>
+            </a:r>
+            <a:r>
+              <a:rPr lang="en-US" dirty="0" smtClean="0"/>
+              <a:t>master）</a:t>
+            </a:r>
+            <a:r>
+              <a:rPr lang="zh-CN" altLang="en-US" dirty="0" smtClean="0"/>
+              <a:t>：</a:t>
+            </a:r>
+            <a:r>
+              <a:rPr lang="en-US" altLang="zh-CN" dirty="0" err="1" smtClean="0">
+                <a:solidFill>
+                  <a:schemeClr val="tx2">
+                    <a:lumMod val="60000"/>
+                    <a:lumOff val="40000"/>
+                  </a:schemeClr>
+                </a:solidFill>
+              </a:rPr>
+              <a:t>git</a:t>
+            </a:r>
+            <a:r>
+              <a:rPr lang="en-US" altLang="zh-CN" dirty="0" smtClean="0">
+                <a:solidFill>
+                  <a:schemeClr val="tx2">
+                    <a:lumMod val="60000"/>
+                    <a:lumOff val="40000"/>
+                  </a:schemeClr>
+                </a:solidFill>
+              </a:rPr>
+              <a:t> checkout master</a:t>
+            </a:r>
+            <a:endParaRPr lang="en-US" dirty="0" smtClean="0">
+              <a:solidFill>
+                <a:schemeClr val="tx2">
+                  <a:lumMod val="60000"/>
+                  <a:lumOff val="40000"/>
+                </a:schemeClr>
+              </a:solidFill>
+            </a:endParaRPr>
+          </a:p>
+          <a:p>
+            <a:pPr>
+              <a:buFont typeface="+mj-lt"/>
+              <a:buAutoNum type="arabicPeriod"/>
+            </a:pPr>
+            <a:r>
+              <a:rPr lang="zh-CN" altLang="en-US" dirty="0" smtClean="0"/>
+              <a:t>合并</a:t>
+            </a:r>
+            <a:r>
+              <a:rPr lang="en-US" altLang="zh-CN" dirty="0" smtClean="0"/>
+              <a:t>dev</a:t>
+            </a:r>
+            <a:r>
+              <a:rPr lang="zh-CN" altLang="en-US" dirty="0" smtClean="0"/>
+              <a:t>分支到目标分支：</a:t>
+            </a:r>
+            <a:r>
+              <a:rPr lang="en-US" altLang="zh-CN" dirty="0" err="1" smtClean="0">
+                <a:solidFill>
+                  <a:schemeClr val="tx2">
+                    <a:lumMod val="60000"/>
+                    <a:lumOff val="40000"/>
+                  </a:schemeClr>
+                </a:solidFill>
+              </a:rPr>
+              <a:t>git</a:t>
+            </a:r>
+            <a:r>
+              <a:rPr lang="en-US" altLang="zh-CN" dirty="0" smtClean="0">
+                <a:solidFill>
+                  <a:schemeClr val="tx2">
+                    <a:lumMod val="60000"/>
+                    <a:lumOff val="40000"/>
+                  </a:schemeClr>
+                </a:solidFill>
+              </a:rPr>
+              <a:t> merge --no-ff dev</a:t>
+            </a:r>
+          </a:p>
+          <a:p>
+            <a:pPr>
+              <a:buFont typeface="+mj-lt"/>
+              <a:buAutoNum type="arabicPeriod"/>
+            </a:pPr>
+            <a:r>
+              <a:rPr lang="zh-CN" altLang="en-US" dirty="0" smtClean="0"/>
+              <a:t>删除</a:t>
+            </a:r>
+            <a:r>
+              <a:rPr lang="en-US" altLang="zh-CN" dirty="0" smtClean="0"/>
+              <a:t>dev</a:t>
+            </a:r>
+            <a:r>
+              <a:rPr lang="zh-CN" altLang="en-US" dirty="0" smtClean="0"/>
+              <a:t>分支：</a:t>
+            </a:r>
+            <a:r>
+              <a:rPr lang="en-US" altLang="zh-CN" dirty="0" err="1" smtClean="0">
+                <a:solidFill>
+                  <a:schemeClr val="tx2">
+                    <a:lumMod val="60000"/>
+                    <a:lumOff val="40000"/>
+                  </a:schemeClr>
+                </a:solidFill>
+              </a:rPr>
+              <a:t>git</a:t>
+            </a:r>
+            <a:r>
+              <a:rPr lang="en-US" altLang="zh-CN" dirty="0" smtClean="0">
+                <a:solidFill>
+                  <a:schemeClr val="tx2">
+                    <a:lumMod val="60000"/>
+                    <a:lumOff val="40000"/>
+                  </a:schemeClr>
+                </a:solidFill>
+              </a:rPr>
+              <a:t> branch -d dev</a:t>
+            </a:r>
+            <a:endParaRPr lang="en-US" dirty="0" smtClean="0">
+              <a:solidFill>
+                <a:schemeClr val="tx2">
+                  <a:lumMod val="60000"/>
+                  <a:lumOff val="40000"/>
+                </a:schemeClr>
+              </a:solidFill>
+            </a:endParaRPr>
+          </a:p>
+          <a:p>
+            <a:pPr>
+              <a:buFont typeface="Wingdings" pitchFamily="2" charset="2"/>
+              <a:buChar char="ü"/>
+            </a:pPr>
+            <a:r>
+              <a:rPr lang="en-US" dirty="0" smtClean="0"/>
+              <a:t>squash merge</a:t>
+            </a:r>
+            <a:r>
+              <a:rPr lang="zh-CN" altLang="en-US" dirty="0" smtClean="0"/>
+              <a:t>：将分支上的所有提交合并成一个</a:t>
+            </a:r>
+            <a:r>
+              <a:rPr lang="en-US" altLang="zh-CN" dirty="0" smtClean="0"/>
+              <a:t>commit</a:t>
+            </a:r>
+            <a:r>
+              <a:rPr lang="zh-CN" altLang="en-US" dirty="0" smtClean="0"/>
+              <a:t>合并到主分支中，可以保持 </a:t>
+            </a:r>
+            <a:r>
+              <a:rPr lang="en-US" dirty="0" smtClean="0"/>
+              <a:t>master </a:t>
+            </a:r>
+            <a:r>
+              <a:rPr lang="zh-CN" altLang="en-US" dirty="0" smtClean="0"/>
+              <a:t>分支干净，但是 </a:t>
+            </a:r>
+            <a:r>
+              <a:rPr lang="en-US" dirty="0" smtClean="0"/>
+              <a:t>master </a:t>
+            </a:r>
+            <a:r>
+              <a:rPr lang="zh-CN" altLang="en-US" dirty="0" smtClean="0"/>
+              <a:t>中提交的作者不是原作者而是维护者</a:t>
+            </a:r>
+            <a:endParaRPr lang="en-US" dirty="0" smtClean="0"/>
+          </a:p>
+          <a:p>
+            <a:r>
+              <a:rPr lang="zh-CN" altLang="en-US" dirty="0" smtClean="0"/>
+              <a:t>使用：</a:t>
+            </a:r>
+            <a:endParaRPr lang="en-US" altLang="zh-CN" dirty="0" smtClean="0"/>
+          </a:p>
+          <a:p>
+            <a:pPr>
+              <a:buFont typeface="+mj-lt"/>
+              <a:buAutoNum type="arabicPeriod"/>
+            </a:pPr>
+            <a:r>
+              <a:rPr lang="zh-CN" altLang="en-US" dirty="0" smtClean="0"/>
+              <a:t>切换到目标分支（如：</a:t>
+            </a:r>
+            <a:r>
+              <a:rPr lang="en-US" dirty="0" smtClean="0"/>
+              <a:t>master）</a:t>
+            </a:r>
+            <a:r>
+              <a:rPr lang="zh-CN" altLang="en-US" dirty="0" smtClean="0"/>
+              <a:t>：</a:t>
+            </a:r>
+            <a:r>
+              <a:rPr lang="en-US" altLang="zh-CN" dirty="0" err="1" smtClean="0">
+                <a:solidFill>
+                  <a:schemeClr val="tx2">
+                    <a:lumMod val="60000"/>
+                    <a:lumOff val="40000"/>
+                  </a:schemeClr>
+                </a:solidFill>
+              </a:rPr>
+              <a:t>git</a:t>
+            </a:r>
+            <a:r>
+              <a:rPr lang="en-US" altLang="zh-CN" dirty="0" smtClean="0">
+                <a:solidFill>
+                  <a:schemeClr val="tx2">
+                    <a:lumMod val="60000"/>
+                    <a:lumOff val="40000"/>
+                  </a:schemeClr>
+                </a:solidFill>
+              </a:rPr>
+              <a:t> checkout master</a:t>
+            </a:r>
+          </a:p>
+          <a:p>
+            <a:pPr>
+              <a:buFont typeface="+mj-lt"/>
+              <a:buAutoNum type="arabicPeriod"/>
+            </a:pPr>
+            <a:r>
+              <a:rPr lang="zh-CN" altLang="en-US" dirty="0" smtClean="0"/>
+              <a:t>合并分支：</a:t>
+            </a:r>
+            <a:r>
+              <a:rPr lang="en-US" altLang="zh-CN" dirty="0" err="1" smtClean="0">
+                <a:solidFill>
+                  <a:schemeClr val="tx2">
+                    <a:lumMod val="60000"/>
+                    <a:lumOff val="40000"/>
+                  </a:schemeClr>
+                </a:solidFill>
+              </a:rPr>
+              <a:t>git</a:t>
+            </a:r>
+            <a:r>
+              <a:rPr lang="en-US" altLang="zh-CN" dirty="0" smtClean="0">
+                <a:solidFill>
+                  <a:schemeClr val="tx2">
+                    <a:lumMod val="60000"/>
+                    <a:lumOff val="40000"/>
+                  </a:schemeClr>
+                </a:solidFill>
+              </a:rPr>
+              <a:t> merge --squash dev</a:t>
+            </a:r>
+          </a:p>
+          <a:p>
+            <a:pPr>
+              <a:buFont typeface="+mj-lt"/>
+              <a:buAutoNum type="arabicPeriod"/>
+            </a:pPr>
+            <a:r>
+              <a:rPr lang="zh-CN" altLang="en-US" dirty="0" smtClean="0"/>
+              <a:t>提交合并（在目标分支上）：</a:t>
+            </a:r>
+            <a:r>
+              <a:rPr lang="en-US" altLang="zh-CN" dirty="0" err="1" smtClean="0">
+                <a:solidFill>
+                  <a:schemeClr val="tx2">
+                    <a:lumMod val="60000"/>
+                    <a:lumOff val="40000"/>
+                  </a:schemeClr>
+                </a:solidFill>
+              </a:rPr>
+              <a:t>git</a:t>
+            </a:r>
+            <a:r>
+              <a:rPr lang="en-US" altLang="zh-CN" dirty="0" smtClean="0">
+                <a:solidFill>
+                  <a:schemeClr val="tx2">
+                    <a:lumMod val="60000"/>
+                    <a:lumOff val="40000"/>
+                  </a:schemeClr>
+                </a:solidFill>
+              </a:rPr>
+              <a:t> commit -m "squash branch“</a:t>
+            </a:r>
+          </a:p>
+          <a:p>
+            <a:pPr>
+              <a:buFont typeface="+mj-lt"/>
+              <a:buAutoNum type="arabicPeriod"/>
+            </a:pPr>
+            <a:r>
+              <a:rPr lang="zh-CN" altLang="en-US" dirty="0" smtClean="0"/>
+              <a:t>删除</a:t>
+            </a:r>
+            <a:r>
+              <a:rPr lang="en-US" altLang="zh-CN" dirty="0" smtClean="0"/>
+              <a:t>dev</a:t>
+            </a:r>
+            <a:r>
+              <a:rPr lang="zh-CN" altLang="en-US" dirty="0" smtClean="0"/>
+              <a:t>分支：</a:t>
+            </a:r>
+            <a:r>
+              <a:rPr lang="en-US" altLang="zh-CN" dirty="0" err="1" smtClean="0">
+                <a:solidFill>
+                  <a:schemeClr val="tx2">
+                    <a:lumMod val="60000"/>
+                    <a:lumOff val="40000"/>
+                  </a:schemeClr>
+                </a:solidFill>
+              </a:rPr>
+              <a:t>git</a:t>
+            </a:r>
+            <a:r>
+              <a:rPr lang="en-US" altLang="zh-CN" dirty="0" smtClean="0">
+                <a:solidFill>
+                  <a:schemeClr val="tx2">
+                    <a:lumMod val="60000"/>
+                    <a:lumOff val="40000"/>
+                  </a:schemeClr>
+                </a:solidFill>
+              </a:rPr>
+              <a:t> branch -d dev</a:t>
+            </a:r>
+          </a:p>
+          <a:p>
+            <a:pPr>
+              <a:buFont typeface="Wingdings" pitchFamily="2" charset="2"/>
+              <a:buChar char="ü"/>
+            </a:pPr>
+            <a:r>
+              <a:rPr lang="en-US" dirty="0" smtClean="0"/>
+              <a:t>rebase merge</a:t>
+            </a:r>
+            <a:r>
+              <a:rPr lang="zh-CN" altLang="en-US" dirty="0" smtClean="0"/>
+              <a:t>：可以尽可能保持 </a:t>
+            </a:r>
+            <a:r>
+              <a:rPr lang="en-US" dirty="0" smtClean="0"/>
+              <a:t>master </a:t>
+            </a:r>
+            <a:r>
+              <a:rPr lang="zh-CN" altLang="en-US" dirty="0" smtClean="0"/>
+              <a:t>分支干净整洁；并且提交的作者是原作者</a:t>
+            </a:r>
+            <a:endParaRPr lang="en-US" altLang="zh-CN" dirty="0" smtClean="0"/>
+          </a:p>
+          <a:p>
+            <a:r>
+              <a:rPr lang="zh-CN" altLang="en-US" dirty="0" smtClean="0"/>
+              <a:t>使用：</a:t>
+            </a:r>
+            <a:endParaRPr lang="en-US" altLang="zh-CN" dirty="0" smtClean="0"/>
+          </a:p>
+          <a:p>
+            <a:pPr marL="457200" indent="-457200">
+              <a:buFont typeface="+mj-lt"/>
+              <a:buAutoNum type="arabicPeriod"/>
+            </a:pPr>
+            <a:r>
+              <a:rPr lang="zh-CN" altLang="en-US" dirty="0" smtClean="0"/>
+              <a:t>切换到 </a:t>
+            </a:r>
+            <a:r>
+              <a:rPr lang="en-US" dirty="0" smtClean="0"/>
+              <a:t>dev</a:t>
+            </a:r>
+            <a:r>
+              <a:rPr lang="zh-CN" altLang="en-US" dirty="0" smtClean="0"/>
+              <a:t>分支（跟上面两种不一样）：</a:t>
+            </a:r>
+            <a:r>
+              <a:rPr lang="en-US" dirty="0" err="1" smtClean="0">
+                <a:solidFill>
+                  <a:schemeClr val="tx2">
+                    <a:lumMod val="60000"/>
+                    <a:lumOff val="40000"/>
+                  </a:schemeClr>
+                </a:solidFill>
+              </a:rPr>
+              <a:t>git</a:t>
+            </a:r>
+            <a:r>
+              <a:rPr lang="en-US" dirty="0" smtClean="0">
+                <a:solidFill>
+                  <a:schemeClr val="tx2">
+                    <a:lumMod val="60000"/>
+                    <a:lumOff val="40000"/>
+                  </a:schemeClr>
+                </a:solidFill>
+              </a:rPr>
+              <a:t> checkout dev</a:t>
+            </a:r>
+          </a:p>
+          <a:p>
+            <a:pPr marL="457200" indent="-457200">
+              <a:buFont typeface="+mj-lt"/>
+              <a:buAutoNum type="arabicPeriod"/>
+            </a:pPr>
+            <a:r>
+              <a:rPr lang="zh-CN" altLang="en-US" dirty="0" smtClean="0"/>
+              <a:t>变基（就是找到两个分支共同的祖先，然后在当前分支（</a:t>
+            </a:r>
+            <a:r>
+              <a:rPr lang="en-US" altLang="zh-CN" dirty="0" smtClean="0"/>
+              <a:t>dev</a:t>
+            </a:r>
+            <a:r>
+              <a:rPr lang="zh-CN" altLang="en-US" dirty="0" smtClean="0"/>
+              <a:t>）上合并从共同祖先到现在的所有 </a:t>
+            </a:r>
+            <a:r>
+              <a:rPr lang="en-US" altLang="zh-CN" dirty="0" smtClean="0"/>
+              <a:t>commit </a:t>
+            </a:r>
+            <a:r>
+              <a:rPr lang="zh-CN" altLang="en-US" dirty="0" smtClean="0"/>
+              <a:t>）：</a:t>
+            </a:r>
+            <a:r>
+              <a:rPr lang="en-US" dirty="0" err="1" smtClean="0">
+                <a:solidFill>
+                  <a:schemeClr val="tx2">
+                    <a:lumMod val="60000"/>
+                    <a:lumOff val="40000"/>
+                  </a:schemeClr>
+                </a:solidFill>
+              </a:rPr>
+              <a:t>git</a:t>
+            </a:r>
+            <a:r>
+              <a:rPr lang="en-US" dirty="0" smtClean="0">
+                <a:solidFill>
+                  <a:schemeClr val="tx2">
+                    <a:lumMod val="60000"/>
+                    <a:lumOff val="40000"/>
+                  </a:schemeClr>
+                </a:solidFill>
+              </a:rPr>
+              <a:t> rebase -</a:t>
+            </a:r>
+            <a:r>
+              <a:rPr lang="en-US" dirty="0" err="1" smtClean="0">
+                <a:solidFill>
+                  <a:schemeClr val="tx2">
+                    <a:lumMod val="60000"/>
+                    <a:lumOff val="40000"/>
+                  </a:schemeClr>
+                </a:solidFill>
+              </a:rPr>
+              <a:t>i</a:t>
+            </a:r>
+            <a:r>
+              <a:rPr lang="en-US" dirty="0" smtClean="0">
+                <a:solidFill>
+                  <a:schemeClr val="tx2">
+                    <a:lumMod val="60000"/>
+                    <a:lumOff val="40000"/>
+                  </a:schemeClr>
+                </a:solidFill>
+              </a:rPr>
+              <a:t> master</a:t>
+            </a:r>
+          </a:p>
+          <a:p>
+            <a:pPr marL="457200" indent="-457200">
+              <a:buFont typeface="+mj-lt"/>
+              <a:buAutoNum type="arabicPeriod"/>
+            </a:pPr>
+            <a:r>
+              <a:rPr lang="zh-CN" altLang="en-US" dirty="0" smtClean="0"/>
+              <a:t>切换回目标分支：</a:t>
+            </a:r>
+            <a:r>
+              <a:rPr lang="en-US" dirty="0" err="1" smtClean="0">
+                <a:solidFill>
+                  <a:schemeClr val="tx2">
+                    <a:lumMod val="60000"/>
+                    <a:lumOff val="40000"/>
+                  </a:schemeClr>
+                </a:solidFill>
+              </a:rPr>
+              <a:t>git</a:t>
+            </a:r>
+            <a:r>
+              <a:rPr lang="en-US" dirty="0" smtClean="0">
+                <a:solidFill>
+                  <a:schemeClr val="tx2">
+                    <a:lumMod val="60000"/>
+                    <a:lumOff val="40000"/>
+                  </a:schemeClr>
+                </a:solidFill>
+              </a:rPr>
+              <a:t> checkout master</a:t>
+            </a:r>
+          </a:p>
+          <a:p>
+            <a:pPr marL="457200" indent="-457200">
+              <a:buFont typeface="+mj-lt"/>
+              <a:buAutoNum type="arabicPeriod"/>
+            </a:pPr>
+            <a:r>
+              <a:rPr lang="zh-CN" altLang="en-US" dirty="0" smtClean="0"/>
+              <a:t>合并</a:t>
+            </a:r>
+            <a:r>
+              <a:rPr lang="en-US" altLang="zh-CN" dirty="0" smtClean="0"/>
+              <a:t>: </a:t>
+            </a:r>
+            <a:r>
+              <a:rPr lang="en-US" dirty="0" err="1" smtClean="0">
+                <a:solidFill>
+                  <a:schemeClr val="tx2">
+                    <a:lumMod val="60000"/>
+                    <a:lumOff val="40000"/>
+                  </a:schemeClr>
+                </a:solidFill>
+              </a:rPr>
+              <a:t>git</a:t>
+            </a:r>
+            <a:r>
+              <a:rPr lang="en-US" dirty="0" smtClean="0">
+                <a:solidFill>
+                  <a:schemeClr val="tx2">
+                    <a:lumMod val="60000"/>
+                    <a:lumOff val="40000"/>
+                  </a:schemeClr>
+                </a:solidFill>
+              </a:rPr>
+              <a:t> merge dev</a:t>
+            </a:r>
+          </a:p>
+          <a:p>
+            <a:endParaRPr lang="en-US" sz="2000" dirty="0" smtClean="0"/>
+          </a:p>
+          <a:p>
+            <a:pPr>
+              <a:buFont typeface="Wingdings" pitchFamily="2" charset="2"/>
+              <a:buChar char="Ø"/>
+            </a:pPr>
+            <a:r>
+              <a:rPr lang="en-US" sz="2000" dirty="0" err="1" smtClean="0"/>
+              <a:t>git</a:t>
+            </a:r>
+            <a:r>
+              <a:rPr lang="en-US" sz="2000" dirty="0" smtClean="0"/>
+              <a:t> rebase </a:t>
+            </a:r>
+            <a:r>
+              <a:rPr lang="en-US" sz="2000" dirty="0" err="1" smtClean="0"/>
+              <a:t>vs</a:t>
+            </a:r>
+            <a:r>
+              <a:rPr lang="en-US" sz="2000" dirty="0" smtClean="0"/>
+              <a:t> </a:t>
+            </a:r>
+            <a:r>
+              <a:rPr lang="en-US" sz="2000" dirty="0" err="1" smtClean="0"/>
+              <a:t>git</a:t>
+            </a:r>
+            <a:r>
+              <a:rPr lang="en-US" sz="2000" dirty="0" smtClean="0"/>
+              <a:t> merge</a:t>
+            </a:r>
+            <a:r>
+              <a:rPr lang="zh-CN" altLang="en-US" sz="2000" dirty="0" smtClean="0"/>
+              <a:t>详解请参考：</a:t>
+            </a:r>
+            <a:r>
+              <a:rPr lang="en-US" altLang="zh-CN" sz="2000" dirty="0" smtClean="0"/>
+              <a:t>https://www.cnblogs.com/kidsitcn/p/5339382.html</a:t>
+            </a:r>
+          </a:p>
+          <a:p>
+            <a:pPr>
+              <a:buFont typeface="Wingdings" pitchFamily="2" charset="2"/>
+              <a:buChar char="Ø"/>
+            </a:pPr>
+            <a:r>
+              <a:rPr lang="zh-CN" altLang="en-US" sz="2000" dirty="0" smtClean="0"/>
+              <a:t>三者区别参考：</a:t>
+            </a:r>
+            <a:r>
+              <a:rPr lang="en-US" altLang="zh-CN" sz="2000" dirty="0" smtClean="0"/>
+              <a:t>https://liuliqiang.info/post/difference-between-merge-squash-and-rebase/</a:t>
+            </a:r>
+            <a:endParaRPr lang="zh-CN" altLang="en-US" sz="2000" dirty="0" smtClean="0"/>
+          </a:p>
+          <a:p>
+            <a:endParaRPr lang="zh-CN" altLang="en-US" dirty="0"/>
+          </a:p>
+        </p:txBody>
+      </p:sp>
+    </p:spTree>
+  </p:cSld>
+  <p:clrMapOvr>
+    <a:masterClrMapping/>
+  </p:clrMapOvr>
+</p:sld>
+</file>
+
+<file path=ppt/slides/slide32.xml><?xml version="1.0" encoding="utf-8"?>
+<p:sld xmlns:a="http://schemas.openxmlformats.org/drawingml/2006/main" xmlns:r="http://schemas.openxmlformats.org/officeDocument/2006/relationships" xmlns:p="http://schemas.openxmlformats.org/presentationml/2006/main">
+  <p:cSld>
+    <p:spTree>
+      <p:nvGrpSpPr>
+        <p:cNvPr id="1" name=""/>
+        <p:cNvGrpSpPr/>
+        <p:nvPr/>
+      </p:nvGrpSpPr>
+      <p:grpSpPr>
+        <a:xfrm>
+          <a:off x="0" y="0"/>
+          <a:ext cx="0" cy="0"/>
+          <a:chOff x="0" y="0"/>
+          <a:chExt cx="0" cy="0"/>
+        </a:xfrm>
+      </p:grpSpPr>
+      <p:sp>
+        <p:nvSpPr>
+          <p:cNvPr id="2" name="标题 1"/>
+          <p:cNvSpPr>
+            <a:spLocks noGrp="1"/>
+          </p:cNvSpPr>
+          <p:nvPr>
+            <p:ph type="title"/>
+          </p:nvPr>
+        </p:nvSpPr>
+        <p:spPr/>
+        <p:txBody>
+          <a:bodyPr/>
+          <a:lstStyle/>
+          <a:p>
+            <a:r>
+              <a:rPr lang="zh-CN" altLang="en-US" dirty="0" smtClean="0"/>
               <a:t>在客户端查看提交的</a:t>
             </a:r>
             <a:r>
@@ -10471,188 +11236,6 @@
           <a:effectLst/>
         </p:spPr>
       </p:pic>
-    </p:spTree>
-  </p:cSld>
-  <p:clrMapOvr>
-    <a:masterClrMapping/>
-  </p:clrMapOvr>
-</p:sld>
-</file>
-
-<file path=ppt/slides/slide32.xml><?xml version="1.0" encoding="utf-8"?>
-<p:sld xmlns:a="http://schemas.openxmlformats.org/drawingml/2006/main" xmlns:r="http://schemas.openxmlformats.org/officeDocument/2006/relationships" xmlns:p="http://schemas.openxmlformats.org/presentationml/2006/main">
-  <p:cSld>
-    <p:spTree>
-      <p:nvGrpSpPr>
-        <p:cNvPr id="1" name=""/>
-        <p:cNvGrpSpPr/>
-        <p:nvPr/>
-      </p:nvGrpSpPr>
-      <p:grpSpPr>
-        <a:xfrm>
-          <a:off x="0" y="0"/>
-          <a:ext cx="0" cy="0"/>
-          <a:chOff x="0" y="0"/>
-          <a:chExt cx="0" cy="0"/>
-        </a:xfrm>
-      </p:grpSpPr>
-      <p:sp>
-        <p:nvSpPr>
-          <p:cNvPr id="2" name="标题 1"/>
-          <p:cNvSpPr>
-            <a:spLocks noGrp="1"/>
-          </p:cNvSpPr>
-          <p:nvPr>
-            <p:ph type="title"/>
-          </p:nvPr>
-        </p:nvSpPr>
-        <p:spPr/>
-        <p:txBody>
-          <a:bodyPr/>
-          <a:lstStyle/>
-          <a:p>
-            <a:r>
-              <a:rPr lang="zh-CN" altLang="en-US" dirty="0" smtClean="0"/>
-              <a:t>合并（</a:t>
-            </a:r>
-            <a:r>
-              <a:rPr lang="en-US" altLang="zh-CN" dirty="0" smtClean="0"/>
-              <a:t>Merge</a:t>
-            </a:r>
-            <a:r>
-              <a:rPr lang="zh-CN" altLang="en-US" dirty="0" smtClean="0"/>
-              <a:t>）</a:t>
-            </a:r>
-            <a:endParaRPr lang="zh-CN" altLang="en-US" dirty="0"/>
-          </a:p>
-        </p:txBody>
-      </p:sp>
-      <p:sp>
-        <p:nvSpPr>
-          <p:cNvPr id="3" name="内容占位符 2"/>
-          <p:cNvSpPr>
-            <a:spLocks noGrp="1"/>
-          </p:cNvSpPr>
-          <p:nvPr>
-            <p:ph idx="1"/>
-          </p:nvPr>
-        </p:nvSpPr>
-        <p:spPr/>
-        <p:txBody>
-          <a:bodyPr>
-            <a:normAutofit lnSpcReduction="10000"/>
-          </a:bodyPr>
-          <a:lstStyle/>
-          <a:p>
-            <a:r>
-              <a:rPr lang="en-US" dirty="0" smtClean="0"/>
-              <a:t>merge </a:t>
-            </a:r>
-            <a:r>
-              <a:rPr lang="zh-CN" altLang="en-US" dirty="0" smtClean="0"/>
-              <a:t>的三种形式：</a:t>
-            </a:r>
-            <a:endParaRPr lang="en-US" altLang="zh-CN" dirty="0" smtClean="0"/>
-          </a:p>
-          <a:p>
-            <a:pPr>
-              <a:buFont typeface="Wingdings" pitchFamily="2" charset="2"/>
-              <a:buChar char="ü"/>
-            </a:pPr>
-            <a:r>
-              <a:rPr lang="zh-CN" altLang="en-US" dirty="0" smtClean="0"/>
-              <a:t>普通的 </a:t>
-            </a:r>
-            <a:r>
-              <a:rPr lang="en-US" dirty="0" smtClean="0"/>
-              <a:t>merge</a:t>
-            </a:r>
-          </a:p>
-          <a:p>
-            <a:pPr>
-              <a:buFont typeface="Wingdings" pitchFamily="2" charset="2"/>
-              <a:buChar char="ü"/>
-            </a:pPr>
-            <a:r>
-              <a:rPr lang="en-US" dirty="0" smtClean="0"/>
-              <a:t>squash merge</a:t>
-            </a:r>
-          </a:p>
-          <a:p>
-            <a:pPr>
-              <a:buFont typeface="Wingdings" pitchFamily="2" charset="2"/>
-              <a:buChar char="ü"/>
-            </a:pPr>
-            <a:r>
-              <a:rPr lang="en-US" dirty="0" smtClean="0"/>
-              <a:t>rebase merge</a:t>
-            </a:r>
-          </a:p>
-          <a:p>
-            <a:pPr>
-              <a:buFont typeface="Wingdings" pitchFamily="2" charset="2"/>
-              <a:buChar char="ü"/>
-            </a:pPr>
-            <a:endParaRPr lang="en-US" dirty="0" smtClean="0"/>
-          </a:p>
-          <a:p>
-            <a:pPr>
-              <a:buFont typeface="Wingdings" pitchFamily="2" charset="2"/>
-              <a:buChar char="ü"/>
-            </a:pPr>
-            <a:endParaRPr lang="en-US" dirty="0" smtClean="0"/>
-          </a:p>
-          <a:p>
-            <a:pPr>
-              <a:buFont typeface="Wingdings" pitchFamily="2" charset="2"/>
-              <a:buChar char="ü"/>
-            </a:pPr>
-            <a:endParaRPr lang="en-US" dirty="0" smtClean="0"/>
-          </a:p>
-          <a:p>
-            <a:pPr>
-              <a:buFont typeface="Wingdings" pitchFamily="2" charset="2"/>
-              <a:buChar char="Ø"/>
-            </a:pPr>
-            <a:r>
-              <a:rPr lang="en-US" sz="1800" dirty="0" err="1" smtClean="0"/>
-              <a:t>git</a:t>
-            </a:r>
-            <a:r>
-              <a:rPr lang="en-US" sz="1800" dirty="0" smtClean="0"/>
-              <a:t> rebase </a:t>
-            </a:r>
-            <a:r>
-              <a:rPr lang="en-US" sz="1800" dirty="0" err="1" smtClean="0"/>
-              <a:t>vs</a:t>
-            </a:r>
-            <a:r>
-              <a:rPr lang="en-US" sz="1800" dirty="0" smtClean="0"/>
-              <a:t> </a:t>
-            </a:r>
-            <a:r>
-              <a:rPr lang="en-US" sz="1800" dirty="0" err="1" smtClean="0"/>
-              <a:t>git</a:t>
-            </a:r>
-            <a:r>
-              <a:rPr lang="en-US" sz="1800" dirty="0" smtClean="0"/>
-              <a:t> merge</a:t>
-            </a:r>
-            <a:r>
-              <a:rPr lang="zh-CN" altLang="en-US" sz="1800" dirty="0" smtClean="0"/>
-              <a:t>详解请参考：</a:t>
-            </a:r>
-            <a:r>
-              <a:rPr lang="en-US" altLang="zh-CN" sz="1800" dirty="0" smtClean="0"/>
-              <a:t>https://www.cnblogs.com/kidsitcn/p/5339382.html</a:t>
-            </a:r>
-            <a:endParaRPr lang="zh-CN" altLang="en-US" sz="1800" dirty="0" smtClean="0"/>
-          </a:p>
-          <a:p>
-            <a:endParaRPr lang="zh-CN" altLang="en-US" dirty="0"/>
-          </a:p>
-        </p:txBody>
-      </p:sp>
     </p:spTree>
   </p:cSld>
   <p:clrMapOvr>

</xml_diff>